<commit_message>
hypo + work on optseq
</commit_message>
<xml_diff>
--- a/BionPres2.pptx
+++ b/BionPres2.pptx
@@ -7480,7 +7480,7 @@
             <a:fld id="{73C3BD54-29B9-3D42-B178-776ED395AA85}" type="datetimeFigureOut">
               <a:rPr lang="en-US" smtClean="0"/>
               <a:pPr/>
-              <a:t>12/16/2021</a:t>
+              <a:t>1/4/2022</a:t>
             </a:fld>
             <a:endParaRPr lang="en-US" sz="1400"/>
           </a:p>
@@ -7730,7 +7730,7 @@
           <a:p>
             <a:fld id="{73C3BD54-29B9-3D42-B178-776ED395AA85}" type="datetimeFigureOut">
               <a:rPr lang="en-US" smtClean="0"/>
-              <a:t>12/16/2021</a:t>
+              <a:t>1/4/2022</a:t>
             </a:fld>
             <a:endParaRPr lang="en-US"/>
           </a:p>
@@ -8044,7 +8044,7 @@
           <a:p>
             <a:fld id="{73C3BD54-29B9-3D42-B178-776ED395AA85}" type="datetimeFigureOut">
               <a:rPr lang="en-US" smtClean="0"/>
-              <a:t>12/16/2021</a:t>
+              <a:t>1/4/2022</a:t>
             </a:fld>
             <a:endParaRPr lang="en-US"/>
           </a:p>
@@ -8558,7 +8558,7 @@
           <a:p>
             <a:fld id="{73C3BD54-29B9-3D42-B178-776ED395AA85}" type="datetimeFigureOut">
               <a:rPr lang="en-US" smtClean="0"/>
-              <a:t>12/16/2021</a:t>
+              <a:t>1/4/2022</a:t>
             </a:fld>
             <a:endParaRPr lang="en-US"/>
           </a:p>
@@ -8989,7 +8989,7 @@
           <a:p>
             <a:fld id="{73C3BD54-29B9-3D42-B178-776ED395AA85}" type="datetimeFigureOut">
               <a:rPr lang="en-US" smtClean="0"/>
-              <a:t>12/16/2021</a:t>
+              <a:t>1/4/2022</a:t>
             </a:fld>
             <a:endParaRPr lang="en-US"/>
           </a:p>
@@ -9254,7 +9254,7 @@
           <a:p>
             <a:fld id="{73C3BD54-29B9-3D42-B178-776ED395AA85}" type="datetimeFigureOut">
               <a:rPr lang="en-US" smtClean="0"/>
-              <a:t>12/16/2021</a:t>
+              <a:t>1/4/2022</a:t>
             </a:fld>
             <a:endParaRPr lang="en-US"/>
           </a:p>
@@ -9828,7 +9828,7 @@
           <a:p>
             <a:fld id="{73C3BD54-29B9-3D42-B178-776ED395AA85}" type="datetimeFigureOut">
               <a:rPr lang="en-US" smtClean="0"/>
-              <a:t>12/16/2021</a:t>
+              <a:t>1/4/2022</a:t>
             </a:fld>
             <a:endParaRPr lang="en-US"/>
           </a:p>
@@ -10131,7 +10131,7 @@
           <a:p>
             <a:fld id="{73C3BD54-29B9-3D42-B178-776ED395AA85}" type="datetimeFigureOut">
               <a:rPr lang="en-US" smtClean="0"/>
-              <a:t>12/16/2021</a:t>
+              <a:t>1/4/2022</a:t>
             </a:fld>
             <a:endParaRPr lang="en-US"/>
           </a:p>
@@ -10406,7 +10406,7 @@
           <a:p>
             <a:fld id="{73C3BD54-29B9-3D42-B178-776ED395AA85}" type="datetimeFigureOut">
               <a:rPr lang="en-US" smtClean="0"/>
-              <a:t>12/16/2021</a:t>
+              <a:t>1/4/2022</a:t>
             </a:fld>
             <a:endParaRPr lang="en-US"/>
           </a:p>
@@ -10877,7 +10877,7 @@
           <a:p>
             <a:fld id="{73C3BD54-29B9-3D42-B178-776ED395AA85}" type="datetimeFigureOut">
               <a:rPr lang="en-US" smtClean="0"/>
-              <a:t>12/16/2021</a:t>
+              <a:t>1/4/2022</a:t>
             </a:fld>
             <a:endParaRPr lang="en-US"/>
           </a:p>
@@ -11328,7 +11328,7 @@
           <a:p>
             <a:fld id="{73C3BD54-29B9-3D42-B178-776ED395AA85}" type="datetimeFigureOut">
               <a:rPr lang="en-US" smtClean="0"/>
-              <a:t>12/16/2021</a:t>
+              <a:t>1/4/2022</a:t>
             </a:fld>
             <a:endParaRPr lang="en-US"/>
           </a:p>
@@ -11724,7 +11724,7 @@
             <a:fld id="{73C3BD54-29B9-3D42-B178-776ED395AA85}" type="datetimeFigureOut">
               <a:rPr lang="en-US" smtClean="0"/>
               <a:pPr/>
-              <a:t>12/16/2021</a:t>
+              <a:t>1/4/2022</a:t>
             </a:fld>
             <a:endParaRPr lang="en-US" dirty="0"/>
           </a:p>
@@ -19960,7 +19960,11 @@
           <a:bodyPr/>
           <a:lstStyle/>
           <a:p>
-            <a:endParaRPr lang="fr-FR"/>
+            <a:r>
+              <a:rPr lang="fr-FR" dirty="0" err="1"/>
+              <a:t>Hypotheses</a:t>
+            </a:r>
+            <a:endParaRPr lang="fr-FR" dirty="0"/>
           </a:p>
         </p:txBody>
       </p:sp>
@@ -19977,84 +19981,75 @@
             <a:spLocks noGrp="1"/>
           </p:cNvSpPr>
           <p:nvPr>
-            <p:ph sz="half" idx="1"/>
+            <p:ph idx="1"/>
           </p:nvPr>
         </p:nvSpPr>
         <p:spPr/>
         <p:txBody>
-          <a:bodyPr/>
+          <a:bodyPr>
+            <a:normAutofit fontScale="77500" lnSpcReduction="20000"/>
+          </a:bodyPr>
           <a:lstStyle/>
           <a:p>
             <a:r>
-              <a:rPr lang="fr-FR" dirty="0" err="1"/>
-              <a:t>Semantic</a:t>
-            </a:r>
-            <a:r>
-              <a:rPr lang="fr-FR" dirty="0"/>
-              <a:t> facilitation </a:t>
-            </a:r>
-            <a:r>
-              <a:rPr lang="fr-FR" dirty="0" err="1"/>
-              <a:t>happens</a:t>
-            </a:r>
-            <a:r>
-              <a:rPr lang="fr-FR" dirty="0"/>
-              <a:t> </a:t>
-            </a:r>
-            <a:r>
-              <a:rPr lang="fr-FR" dirty="0" err="1"/>
-              <a:t>because</a:t>
-            </a:r>
-            <a:r>
-              <a:rPr lang="fr-FR" dirty="0"/>
-              <a:t> </a:t>
-            </a:r>
-            <a:r>
-              <a:rPr lang="fr-FR" dirty="0" err="1"/>
-              <a:t>less</a:t>
-            </a:r>
-            <a:r>
-              <a:rPr lang="fr-FR" dirty="0"/>
-              <a:t> OFC-hippo </a:t>
-            </a:r>
-            <a:r>
-              <a:rPr lang="fr-FR" dirty="0" err="1"/>
-              <a:t>involvement</a:t>
-            </a:r>
-            <a:r>
-              <a:rPr lang="fr-FR" dirty="0"/>
-              <a:t> </a:t>
-            </a:r>
-            <a:r>
-              <a:rPr lang="fr-FR" dirty="0" err="1"/>
-              <a:t>necessary</a:t>
+              <a:rPr lang="en-US" dirty="0"/>
+              <a:t>Reactivation of the associated stim earlier </a:t>
+            </a:r>
+          </a:p>
+          <a:p>
+            <a:r>
+              <a:rPr lang="en-US" dirty="0"/>
+              <a:t>Reduced </a:t>
+            </a:r>
+            <a:r>
+              <a:rPr lang="en-US" dirty="0" err="1"/>
+              <a:t>functionnal</a:t>
+            </a:r>
+            <a:r>
+              <a:rPr lang="en-US" dirty="0"/>
+              <a:t> connectivity hippo-striatum and hippo-OFC (because hippo not necessary anymore to recover associated stimulus state) </a:t>
+            </a:r>
+          </a:p>
+          <a:p>
+            <a:r>
+              <a:rPr lang="en-US" dirty="0"/>
+              <a:t>Bold (a) hippo during </a:t>
+            </a:r>
+            <a:r>
+              <a:rPr lang="en-US" dirty="0" err="1"/>
+              <a:t>Conditionning</a:t>
+            </a:r>
+            <a:r>
+              <a:rPr lang="en-US" dirty="0"/>
+              <a:t> Phase doesn't predict performance, but another (semantic) region might </a:t>
+            </a:r>
+          </a:p>
+          <a:p>
+            <a:r>
+              <a:rPr lang="en-US" dirty="0"/>
+              <a:t>Representational similarity might predict performance in hippo/OFC? (state encoding – not in temporal cx otherwise </a:t>
+            </a:r>
+            <a:r>
+              <a:rPr lang="en-US" dirty="0" err="1"/>
+              <a:t>douple</a:t>
+            </a:r>
+            <a:r>
+              <a:rPr lang="en-US" dirty="0"/>
+              <a:t> dipping)</a:t>
+            </a:r>
+          </a:p>
+          <a:p>
+            <a:r>
+              <a:rPr lang="en-US" dirty="0"/>
+              <a:t>Decoding of state and stim - to think about more </a:t>
+            </a:r>
+          </a:p>
+          <a:p>
+            <a:r>
+              <a:rPr lang="en-US" dirty="0"/>
+              <a:t>Interaction with reward - to think about more - hippo-striatum connectivity, strengthen effect</a:t>
             </a:r>
             <a:endParaRPr lang="fr-FR" dirty="0"/>
-          </a:p>
-        </p:txBody>
-      </p:sp>
-      <p:sp>
-        <p:nvSpPr>
-          <p:cNvPr id="4" name="Espace réservé du contenu 3">
-            <a:extLst>
-              <a:ext uri="{FF2B5EF4-FFF2-40B4-BE49-F238E27FC236}">
-                <a16:creationId xmlns:a16="http://schemas.microsoft.com/office/drawing/2014/main" id="{B614AAA8-F273-4C91-B45E-6E306E6B9A98}"/>
-              </a:ext>
-            </a:extLst>
-          </p:cNvPr>
-          <p:cNvSpPr>
-            <a:spLocks noGrp="1"/>
-          </p:cNvSpPr>
-          <p:nvPr>
-            <p:ph sz="half" idx="2"/>
-          </p:nvPr>
-        </p:nvSpPr>
-        <p:spPr/>
-        <p:txBody>
-          <a:bodyPr/>
-          <a:lstStyle/>
-          <a:p>
-            <a:endParaRPr lang="fr-FR"/>
           </a:p>
         </p:txBody>
       </p:sp>

</xml_diff>